<commit_message>
programming finished for experiment 2
</commit_message>
<xml_diff>
--- a/dist/Experiments/Experiment2/resources/procedure.pptx
+++ b/dist/Experiments/Experiment2/resources/procedure.pptx
@@ -6,7 +6,6 @@
   </p:sldMasterIdLst>
   <p:sldIdLst>
     <p:sldId id="256" r:id="rId2"/>
-    <p:sldId id="257" r:id="rId3"/>
   </p:sldIdLst>
   <p:sldSz cx="12192000" cy="6858000"/>
   <p:notesSz cx="6858000" cy="9144000"/>
@@ -105,6 +104,11 @@
       </a:defRPr>
     </a:lvl9pPr>
   </p:defaultTextStyle>
+  <p:extLst>
+    <p:ext uri="{EFAFB233-063F-42B5-8137-9DF3F51BA10A}">
+      <p15:sldGuideLst xmlns:p15="http://schemas.microsoft.com/office/powerpoint/2012/main"/>
+    </p:ext>
+  </p:extLst>
 </p:presentation>
 </file>
 
@@ -239,7 +243,7 @@
           <a:p>
             <a:fld id="{9696521B-36EB-4EBA-9025-89831F60C181}" type="datetimeFigureOut">
               <a:rPr lang="zh-TW" altLang="en-US" smtClean="0"/>
-              <a:t>2016/11/16</a:t>
+              <a:t>2017/4/25</a:t>
             </a:fld>
             <a:endParaRPr lang="zh-TW" altLang="en-US"/>
           </a:p>
@@ -409,7 +413,7 @@
           <a:p>
             <a:fld id="{9696521B-36EB-4EBA-9025-89831F60C181}" type="datetimeFigureOut">
               <a:rPr lang="zh-TW" altLang="en-US" smtClean="0"/>
-              <a:t>2016/11/16</a:t>
+              <a:t>2017/4/25</a:t>
             </a:fld>
             <a:endParaRPr lang="zh-TW" altLang="en-US"/>
           </a:p>
@@ -589,7 +593,7 @@
           <a:p>
             <a:fld id="{9696521B-36EB-4EBA-9025-89831F60C181}" type="datetimeFigureOut">
               <a:rPr lang="zh-TW" altLang="en-US" smtClean="0"/>
-              <a:t>2016/11/16</a:t>
+              <a:t>2017/4/25</a:t>
             </a:fld>
             <a:endParaRPr lang="zh-TW" altLang="en-US"/>
           </a:p>
@@ -759,7 +763,7 @@
           <a:p>
             <a:fld id="{9696521B-36EB-4EBA-9025-89831F60C181}" type="datetimeFigureOut">
               <a:rPr lang="zh-TW" altLang="en-US" smtClean="0"/>
-              <a:t>2016/11/16</a:t>
+              <a:t>2017/4/25</a:t>
             </a:fld>
             <a:endParaRPr lang="zh-TW" altLang="en-US"/>
           </a:p>
@@ -1005,7 +1009,7 @@
           <a:p>
             <a:fld id="{9696521B-36EB-4EBA-9025-89831F60C181}" type="datetimeFigureOut">
               <a:rPr lang="zh-TW" altLang="en-US" smtClean="0"/>
-              <a:t>2016/11/16</a:t>
+              <a:t>2017/4/25</a:t>
             </a:fld>
             <a:endParaRPr lang="zh-TW" altLang="en-US"/>
           </a:p>
@@ -1237,7 +1241,7 @@
           <a:p>
             <a:fld id="{9696521B-36EB-4EBA-9025-89831F60C181}" type="datetimeFigureOut">
               <a:rPr lang="zh-TW" altLang="en-US" smtClean="0"/>
-              <a:t>2016/11/16</a:t>
+              <a:t>2017/4/25</a:t>
             </a:fld>
             <a:endParaRPr lang="zh-TW" altLang="en-US"/>
           </a:p>
@@ -1604,7 +1608,7 @@
           <a:p>
             <a:fld id="{9696521B-36EB-4EBA-9025-89831F60C181}" type="datetimeFigureOut">
               <a:rPr lang="zh-TW" altLang="en-US" smtClean="0"/>
-              <a:t>2016/11/16</a:t>
+              <a:t>2017/4/25</a:t>
             </a:fld>
             <a:endParaRPr lang="zh-TW" altLang="en-US"/>
           </a:p>
@@ -1722,7 +1726,7 @@
           <a:p>
             <a:fld id="{9696521B-36EB-4EBA-9025-89831F60C181}" type="datetimeFigureOut">
               <a:rPr lang="zh-TW" altLang="en-US" smtClean="0"/>
-              <a:t>2016/11/16</a:t>
+              <a:t>2017/4/25</a:t>
             </a:fld>
             <a:endParaRPr lang="zh-TW" altLang="en-US"/>
           </a:p>
@@ -1817,7 +1821,7 @@
           <a:p>
             <a:fld id="{9696521B-36EB-4EBA-9025-89831F60C181}" type="datetimeFigureOut">
               <a:rPr lang="zh-TW" altLang="en-US" smtClean="0"/>
-              <a:t>2016/11/16</a:t>
+              <a:t>2017/4/25</a:t>
             </a:fld>
             <a:endParaRPr lang="zh-TW" altLang="en-US"/>
           </a:p>
@@ -2094,7 +2098,7 @@
           <a:p>
             <a:fld id="{9696521B-36EB-4EBA-9025-89831F60C181}" type="datetimeFigureOut">
               <a:rPr lang="zh-TW" altLang="en-US" smtClean="0"/>
-              <a:t>2016/11/16</a:t>
+              <a:t>2017/4/25</a:t>
             </a:fld>
             <a:endParaRPr lang="zh-TW" altLang="en-US"/>
           </a:p>
@@ -2347,7 +2351,7 @@
           <a:p>
             <a:fld id="{9696521B-36EB-4EBA-9025-89831F60C181}" type="datetimeFigureOut">
               <a:rPr lang="zh-TW" altLang="en-US" smtClean="0"/>
-              <a:t>2016/11/16</a:t>
+              <a:t>2017/4/25</a:t>
             </a:fld>
             <a:endParaRPr lang="zh-TW" altLang="en-US"/>
           </a:p>
@@ -2560,7 +2564,7 @@
           <a:p>
             <a:fld id="{9696521B-36EB-4EBA-9025-89831F60C181}" type="datetimeFigureOut">
               <a:rPr lang="zh-TW" altLang="en-US" smtClean="0"/>
-              <a:t>2016/11/16</a:t>
+              <a:t>2017/4/25</a:t>
             </a:fld>
             <a:endParaRPr lang="zh-TW" altLang="en-US"/>
           </a:p>
@@ -2967,1079 +2971,15 @@
       </p:grpSpPr>
       <p:grpSp>
         <p:nvGrpSpPr>
-          <p:cNvPr id="30" name="群組 29"/>
+          <p:cNvPr id="24" name="群組 23"/>
           <p:cNvGrpSpPr/>
           <p:nvPr/>
         </p:nvGrpSpPr>
         <p:grpSpPr>
           <a:xfrm>
-            <a:off x="1822310" y="1243434"/>
-            <a:ext cx="9160429" cy="3205846"/>
-            <a:chOff x="1822310" y="1243434"/>
-            <a:chExt cx="9160429" cy="3205846"/>
-          </a:xfrm>
-        </p:grpSpPr>
-        <p:grpSp>
-          <p:nvGrpSpPr>
-            <p:cNvPr id="24" name="群組 23"/>
-            <p:cNvGrpSpPr/>
-            <p:nvPr/>
-          </p:nvGrpSpPr>
-          <p:grpSpPr>
-            <a:xfrm>
-              <a:off x="1822310" y="1243435"/>
-              <a:ext cx="3902893" cy="2686137"/>
-              <a:chOff x="1133341" y="1210613"/>
-              <a:chExt cx="3902893" cy="2686137"/>
-            </a:xfrm>
-          </p:grpSpPr>
-          <p:sp>
-            <p:nvSpPr>
-              <p:cNvPr id="4" name="矩形 3"/>
-              <p:cNvSpPr/>
-              <p:nvPr/>
-            </p:nvSpPr>
-            <p:spPr>
-              <a:xfrm>
-                <a:off x="1133341" y="1210613"/>
-                <a:ext cx="3902893" cy="2686137"/>
-              </a:xfrm>
-              <a:prstGeom prst="rect">
-                <a:avLst/>
-              </a:prstGeom>
-              <a:solidFill>
-                <a:schemeClr val="bg1">
-                  <a:lumMod val="65000"/>
-                </a:schemeClr>
-              </a:solidFill>
-              <a:ln>
-                <a:noFill/>
-              </a:ln>
-            </p:spPr>
-            <p:style>
-              <a:lnRef idx="2">
-                <a:schemeClr val="accent1">
-                  <a:shade val="50000"/>
-                </a:schemeClr>
-              </a:lnRef>
-              <a:fillRef idx="1">
-                <a:schemeClr val="accent1"/>
-              </a:fillRef>
-              <a:effectRef idx="0">
-                <a:schemeClr val="accent1"/>
-              </a:effectRef>
-              <a:fontRef idx="minor">
-                <a:schemeClr val="lt1"/>
-              </a:fontRef>
-            </p:style>
-            <p:txBody>
-              <a:bodyPr rtlCol="0" anchor="ctr"/>
-              <a:lstStyle/>
-              <a:p>
-                <a:pPr algn="ctr"/>
-                <a:endParaRPr lang="zh-TW" altLang="en-US"/>
-              </a:p>
-            </p:txBody>
-          </p:sp>
-          <p:sp>
-            <p:nvSpPr>
-              <p:cNvPr id="6" name="矩形 5"/>
-              <p:cNvSpPr/>
-              <p:nvPr/>
-            </p:nvSpPr>
-            <p:spPr>
-              <a:xfrm>
-                <a:off x="2831569" y="1842868"/>
-                <a:ext cx="253218" cy="253218"/>
-              </a:xfrm>
-              <a:prstGeom prst="rect">
-                <a:avLst/>
-              </a:prstGeom>
-              <a:solidFill>
-                <a:srgbClr val="FF0000"/>
-              </a:solidFill>
-              <a:ln>
-                <a:noFill/>
-              </a:ln>
-            </p:spPr>
-            <p:style>
-              <a:lnRef idx="2">
-                <a:schemeClr val="accent1">
-                  <a:shade val="50000"/>
-                </a:schemeClr>
-              </a:lnRef>
-              <a:fillRef idx="1">
-                <a:schemeClr val="accent1"/>
-              </a:fillRef>
-              <a:effectRef idx="0">
-                <a:schemeClr val="accent1"/>
-              </a:effectRef>
-              <a:fontRef idx="minor">
-                <a:schemeClr val="lt1"/>
-              </a:fontRef>
-            </p:style>
-            <p:txBody>
-              <a:bodyPr rtlCol="0" anchor="ctr"/>
-              <a:lstStyle/>
-              <a:p>
-                <a:pPr algn="ctr"/>
-                <a:endParaRPr lang="zh-TW" altLang="en-US"/>
-              </a:p>
-            </p:txBody>
-          </p:sp>
-          <p:sp>
-            <p:nvSpPr>
-              <p:cNvPr id="7" name="矩形 6"/>
-              <p:cNvSpPr/>
-              <p:nvPr/>
-            </p:nvSpPr>
-            <p:spPr>
-              <a:xfrm>
-                <a:off x="2820817" y="3097238"/>
-                <a:ext cx="253218" cy="253218"/>
-              </a:xfrm>
-              <a:prstGeom prst="rect">
-                <a:avLst/>
-              </a:prstGeom>
-              <a:solidFill>
-                <a:srgbClr val="FFFF00"/>
-              </a:solidFill>
-              <a:ln>
-                <a:noFill/>
-              </a:ln>
-            </p:spPr>
-            <p:style>
-              <a:lnRef idx="2">
-                <a:schemeClr val="accent1">
-                  <a:shade val="50000"/>
-                </a:schemeClr>
-              </a:lnRef>
-              <a:fillRef idx="1">
-                <a:schemeClr val="accent1"/>
-              </a:fillRef>
-              <a:effectRef idx="0">
-                <a:schemeClr val="accent1"/>
-              </a:effectRef>
-              <a:fontRef idx="minor">
-                <a:schemeClr val="lt1"/>
-              </a:fontRef>
-            </p:style>
-            <p:txBody>
-              <a:bodyPr rtlCol="0" anchor="ctr"/>
-              <a:lstStyle/>
-              <a:p>
-                <a:pPr algn="ctr"/>
-                <a:endParaRPr lang="zh-TW" altLang="en-US"/>
-              </a:p>
-            </p:txBody>
-          </p:sp>
-          <p:sp>
-            <p:nvSpPr>
-              <p:cNvPr id="8" name="矩形 7"/>
-              <p:cNvSpPr/>
-              <p:nvPr/>
-            </p:nvSpPr>
-            <p:spPr>
-              <a:xfrm>
-                <a:off x="2226212" y="2180492"/>
-                <a:ext cx="253218" cy="253218"/>
-              </a:xfrm>
-              <a:prstGeom prst="rect">
-                <a:avLst/>
-              </a:prstGeom>
-              <a:solidFill>
-                <a:schemeClr val="accent6">
-                  <a:lumMod val="60000"/>
-                  <a:lumOff val="40000"/>
-                </a:schemeClr>
-              </a:solidFill>
-              <a:ln>
-                <a:noFill/>
-              </a:ln>
-            </p:spPr>
-            <p:style>
-              <a:lnRef idx="2">
-                <a:schemeClr val="accent1">
-                  <a:shade val="50000"/>
-                </a:schemeClr>
-              </a:lnRef>
-              <a:fillRef idx="1">
-                <a:schemeClr val="accent1"/>
-              </a:fillRef>
-              <a:effectRef idx="0">
-                <a:schemeClr val="accent1"/>
-              </a:effectRef>
-              <a:fontRef idx="minor">
-                <a:schemeClr val="lt1"/>
-              </a:fontRef>
-            </p:style>
-            <p:txBody>
-              <a:bodyPr rtlCol="0" anchor="ctr"/>
-              <a:lstStyle/>
-              <a:p>
-                <a:pPr algn="ctr"/>
-                <a:endParaRPr lang="zh-TW" altLang="en-US"/>
-              </a:p>
-            </p:txBody>
-          </p:sp>
-          <p:sp>
-            <p:nvSpPr>
-              <p:cNvPr id="9" name="矩形 8"/>
-              <p:cNvSpPr/>
-              <p:nvPr/>
-            </p:nvSpPr>
-            <p:spPr>
-              <a:xfrm>
-                <a:off x="3826576" y="3097238"/>
-                <a:ext cx="253218" cy="253218"/>
-              </a:xfrm>
-              <a:prstGeom prst="rect">
-                <a:avLst/>
-              </a:prstGeom>
-              <a:solidFill>
-                <a:schemeClr val="accent5"/>
-              </a:solidFill>
-              <a:ln>
-                <a:noFill/>
-              </a:ln>
-            </p:spPr>
-            <p:style>
-              <a:lnRef idx="2">
-                <a:schemeClr val="accent1">
-                  <a:shade val="50000"/>
-                </a:schemeClr>
-              </a:lnRef>
-              <a:fillRef idx="1">
-                <a:schemeClr val="accent1"/>
-              </a:fillRef>
-              <a:effectRef idx="0">
-                <a:schemeClr val="accent1"/>
-              </a:effectRef>
-              <a:fontRef idx="minor">
-                <a:schemeClr val="lt1"/>
-              </a:fontRef>
-            </p:style>
-            <p:txBody>
-              <a:bodyPr rtlCol="0" anchor="ctr"/>
-              <a:lstStyle/>
-              <a:p>
-                <a:pPr algn="ctr"/>
-                <a:endParaRPr lang="zh-TW" altLang="en-US"/>
-              </a:p>
-            </p:txBody>
-          </p:sp>
-          <p:sp>
-            <p:nvSpPr>
-              <p:cNvPr id="10" name="矩形 9"/>
-              <p:cNvSpPr/>
-              <p:nvPr/>
-            </p:nvSpPr>
-            <p:spPr>
-              <a:xfrm>
-                <a:off x="3247292" y="2096086"/>
-                <a:ext cx="253218" cy="253218"/>
-              </a:xfrm>
-              <a:prstGeom prst="rect">
-                <a:avLst/>
-              </a:prstGeom>
-              <a:solidFill>
-                <a:schemeClr val="accent5">
-                  <a:lumMod val="75000"/>
-                </a:schemeClr>
-              </a:solidFill>
-              <a:ln>
-                <a:noFill/>
-              </a:ln>
-            </p:spPr>
-            <p:style>
-              <a:lnRef idx="2">
-                <a:schemeClr val="accent1">
-                  <a:shade val="50000"/>
-                </a:schemeClr>
-              </a:lnRef>
-              <a:fillRef idx="1">
-                <a:schemeClr val="accent1"/>
-              </a:fillRef>
-              <a:effectRef idx="0">
-                <a:schemeClr val="accent1"/>
-              </a:effectRef>
-              <a:fontRef idx="minor">
-                <a:schemeClr val="lt1"/>
-              </a:fontRef>
-            </p:style>
-            <p:txBody>
-              <a:bodyPr rtlCol="0" anchor="ctr"/>
-              <a:lstStyle/>
-              <a:p>
-                <a:pPr algn="ctr"/>
-                <a:endParaRPr lang="zh-TW" altLang="en-US"/>
-              </a:p>
-            </p:txBody>
-          </p:sp>
-          <p:sp>
-            <p:nvSpPr>
-              <p:cNvPr id="11" name="矩形 10"/>
-              <p:cNvSpPr/>
-              <p:nvPr/>
-            </p:nvSpPr>
-            <p:spPr>
-              <a:xfrm>
-                <a:off x="2123939" y="3097238"/>
-                <a:ext cx="253218" cy="253218"/>
-              </a:xfrm>
-              <a:prstGeom prst="rect">
-                <a:avLst/>
-              </a:prstGeom>
-              <a:solidFill>
-                <a:schemeClr val="accent5">
-                  <a:lumMod val="50000"/>
-                </a:schemeClr>
-              </a:solidFill>
-              <a:ln>
-                <a:noFill/>
-              </a:ln>
-            </p:spPr>
-            <p:style>
-              <a:lnRef idx="2">
-                <a:schemeClr val="accent1">
-                  <a:shade val="50000"/>
-                </a:schemeClr>
-              </a:lnRef>
-              <a:fillRef idx="1">
-                <a:schemeClr val="accent1"/>
-              </a:fillRef>
-              <a:effectRef idx="0">
-                <a:schemeClr val="accent1"/>
-              </a:effectRef>
-              <a:fontRef idx="minor">
-                <a:schemeClr val="lt1"/>
-              </a:fontRef>
-            </p:style>
-            <p:txBody>
-              <a:bodyPr rtlCol="0" anchor="ctr"/>
-              <a:lstStyle/>
-              <a:p>
-                <a:pPr algn="ctr"/>
-                <a:endParaRPr lang="zh-TW" altLang="en-US"/>
-              </a:p>
-            </p:txBody>
-          </p:sp>
-          <p:sp>
-            <p:nvSpPr>
-              <p:cNvPr id="12" name="矩形 11"/>
-              <p:cNvSpPr/>
-              <p:nvPr/>
-            </p:nvSpPr>
-            <p:spPr>
-              <a:xfrm>
-                <a:off x="1711569" y="2307101"/>
-                <a:ext cx="253218" cy="253218"/>
-              </a:xfrm>
-              <a:prstGeom prst="rect">
-                <a:avLst/>
-              </a:prstGeom>
-              <a:solidFill>
-                <a:schemeClr val="accent2">
-                  <a:lumMod val="60000"/>
-                  <a:lumOff val="40000"/>
-                </a:schemeClr>
-              </a:solidFill>
-              <a:ln>
-                <a:noFill/>
-              </a:ln>
-            </p:spPr>
-            <p:style>
-              <a:lnRef idx="2">
-                <a:schemeClr val="accent1">
-                  <a:shade val="50000"/>
-                </a:schemeClr>
-              </a:lnRef>
-              <a:fillRef idx="1">
-                <a:schemeClr val="accent1"/>
-              </a:fillRef>
-              <a:effectRef idx="0">
-                <a:schemeClr val="accent1"/>
-              </a:effectRef>
-              <a:fontRef idx="minor">
-                <a:schemeClr val="lt1"/>
-              </a:fontRef>
-            </p:style>
-            <p:txBody>
-              <a:bodyPr rtlCol="0" anchor="ctr"/>
-              <a:lstStyle/>
-              <a:p>
-                <a:pPr algn="ctr"/>
-                <a:endParaRPr lang="zh-TW" altLang="en-US"/>
-              </a:p>
-            </p:txBody>
-          </p:sp>
-          <p:sp>
-            <p:nvSpPr>
-              <p:cNvPr id="13" name="矩形 12"/>
-              <p:cNvSpPr/>
-              <p:nvPr/>
-            </p:nvSpPr>
-            <p:spPr>
-              <a:xfrm>
-                <a:off x="4116864" y="2053883"/>
-                <a:ext cx="253218" cy="253218"/>
-              </a:xfrm>
-              <a:prstGeom prst="rect">
-                <a:avLst/>
-              </a:prstGeom>
-              <a:solidFill>
-                <a:schemeClr val="accent2">
-                  <a:lumMod val="50000"/>
-                </a:schemeClr>
-              </a:solidFill>
-              <a:ln>
-                <a:noFill/>
-              </a:ln>
-            </p:spPr>
-            <p:style>
-              <a:lnRef idx="2">
-                <a:schemeClr val="accent1">
-                  <a:shade val="50000"/>
-                </a:schemeClr>
-              </a:lnRef>
-              <a:fillRef idx="1">
-                <a:schemeClr val="accent1"/>
-              </a:fillRef>
-              <a:effectRef idx="0">
-                <a:schemeClr val="accent1"/>
-              </a:effectRef>
-              <a:fontRef idx="minor">
-                <a:schemeClr val="lt1"/>
-              </a:fontRef>
-            </p:style>
-            <p:txBody>
-              <a:bodyPr rtlCol="0" anchor="ctr"/>
-              <a:lstStyle/>
-              <a:p>
-                <a:pPr algn="ctr"/>
-                <a:endParaRPr lang="zh-TW" altLang="en-US"/>
-              </a:p>
-            </p:txBody>
-          </p:sp>
-        </p:grpSp>
-        <p:grpSp>
-          <p:nvGrpSpPr>
-            <p:cNvPr id="23" name="群組 22"/>
-            <p:cNvGrpSpPr/>
-            <p:nvPr/>
-          </p:nvGrpSpPr>
-          <p:grpSpPr>
-            <a:xfrm>
-              <a:off x="7079846" y="1243434"/>
-              <a:ext cx="3902893" cy="2686137"/>
-              <a:chOff x="7150185" y="1227026"/>
-              <a:chExt cx="3902893" cy="2686137"/>
-            </a:xfrm>
-          </p:grpSpPr>
-          <p:sp>
-            <p:nvSpPr>
-              <p:cNvPr id="14" name="矩形 13"/>
-              <p:cNvSpPr/>
-              <p:nvPr/>
-            </p:nvSpPr>
-            <p:spPr>
-              <a:xfrm>
-                <a:off x="7150185" y="1227026"/>
-                <a:ext cx="3902893" cy="2686137"/>
-              </a:xfrm>
-              <a:prstGeom prst="rect">
-                <a:avLst/>
-              </a:prstGeom>
-              <a:solidFill>
-                <a:schemeClr val="bg1">
-                  <a:lumMod val="65000"/>
-                </a:schemeClr>
-              </a:solidFill>
-              <a:ln>
-                <a:noFill/>
-              </a:ln>
-            </p:spPr>
-            <p:style>
-              <a:lnRef idx="2">
-                <a:schemeClr val="accent1">
-                  <a:shade val="50000"/>
-                </a:schemeClr>
-              </a:lnRef>
-              <a:fillRef idx="1">
-                <a:schemeClr val="accent1"/>
-              </a:fillRef>
-              <a:effectRef idx="0">
-                <a:schemeClr val="accent1"/>
-              </a:effectRef>
-              <a:fontRef idx="minor">
-                <a:schemeClr val="lt1"/>
-              </a:fontRef>
-            </p:style>
-            <p:txBody>
-              <a:bodyPr rtlCol="0" anchor="ctr"/>
-              <a:lstStyle/>
-              <a:p>
-                <a:pPr algn="ctr"/>
-                <a:endParaRPr lang="zh-TW" altLang="en-US"/>
-              </a:p>
-            </p:txBody>
-          </p:sp>
-          <p:sp>
-            <p:nvSpPr>
-              <p:cNvPr id="15" name="矩形 14"/>
-              <p:cNvSpPr/>
-              <p:nvPr/>
-            </p:nvSpPr>
-            <p:spPr>
-              <a:xfrm>
-                <a:off x="9589849" y="1716259"/>
-                <a:ext cx="253218" cy="253218"/>
-              </a:xfrm>
-              <a:prstGeom prst="rect">
-                <a:avLst/>
-              </a:prstGeom>
-              <a:solidFill>
-                <a:srgbClr val="FF0000"/>
-              </a:solidFill>
-              <a:ln>
-                <a:noFill/>
-              </a:ln>
-            </p:spPr>
-            <p:style>
-              <a:lnRef idx="2">
-                <a:schemeClr val="accent1">
-                  <a:shade val="50000"/>
-                </a:schemeClr>
-              </a:lnRef>
-              <a:fillRef idx="1">
-                <a:schemeClr val="accent1"/>
-              </a:fillRef>
-              <a:effectRef idx="0">
-                <a:schemeClr val="accent1"/>
-              </a:effectRef>
-              <a:fontRef idx="minor">
-                <a:schemeClr val="lt1"/>
-              </a:fontRef>
-            </p:style>
-            <p:txBody>
-              <a:bodyPr rtlCol="0" anchor="ctr"/>
-              <a:lstStyle/>
-              <a:p>
-                <a:pPr algn="ctr"/>
-                <a:endParaRPr lang="zh-TW" altLang="en-US"/>
-              </a:p>
-            </p:txBody>
-          </p:sp>
-          <p:sp>
-            <p:nvSpPr>
-              <p:cNvPr id="16" name="矩形 15"/>
-              <p:cNvSpPr/>
-              <p:nvPr/>
-            </p:nvSpPr>
-            <p:spPr>
-              <a:xfrm>
-                <a:off x="7816336" y="1716259"/>
-                <a:ext cx="253218" cy="253218"/>
-              </a:xfrm>
-              <a:prstGeom prst="rect">
-                <a:avLst/>
-              </a:prstGeom>
-              <a:solidFill>
-                <a:srgbClr val="FFFF00"/>
-              </a:solidFill>
-              <a:ln>
-                <a:noFill/>
-              </a:ln>
-            </p:spPr>
-            <p:style>
-              <a:lnRef idx="2">
-                <a:schemeClr val="accent1">
-                  <a:shade val="50000"/>
-                </a:schemeClr>
-              </a:lnRef>
-              <a:fillRef idx="1">
-                <a:schemeClr val="accent1"/>
-              </a:fillRef>
-              <a:effectRef idx="0">
-                <a:schemeClr val="accent1"/>
-              </a:effectRef>
-              <a:fontRef idx="minor">
-                <a:schemeClr val="lt1"/>
-              </a:fontRef>
-            </p:style>
-            <p:txBody>
-              <a:bodyPr rtlCol="0" anchor="ctr"/>
-              <a:lstStyle/>
-              <a:p>
-                <a:pPr algn="ctr"/>
-                <a:endParaRPr lang="zh-TW" altLang="en-US"/>
-              </a:p>
-            </p:txBody>
-          </p:sp>
-          <p:sp>
-            <p:nvSpPr>
-              <p:cNvPr id="17" name="矩形 16"/>
-              <p:cNvSpPr/>
-              <p:nvPr/>
-            </p:nvSpPr>
-            <p:spPr>
-              <a:xfrm>
-                <a:off x="7597559" y="2602522"/>
-                <a:ext cx="253218" cy="253218"/>
-              </a:xfrm>
-              <a:prstGeom prst="rect">
-                <a:avLst/>
-              </a:prstGeom>
-              <a:solidFill>
-                <a:schemeClr val="accent6">
-                  <a:lumMod val="60000"/>
-                  <a:lumOff val="40000"/>
-                </a:schemeClr>
-              </a:solidFill>
-              <a:ln>
-                <a:noFill/>
-              </a:ln>
-            </p:spPr>
-            <p:style>
-              <a:lnRef idx="2">
-                <a:schemeClr val="accent1">
-                  <a:shade val="50000"/>
-                </a:schemeClr>
-              </a:lnRef>
-              <a:fillRef idx="1">
-                <a:schemeClr val="accent1"/>
-              </a:fillRef>
-              <a:effectRef idx="0">
-                <a:schemeClr val="accent1"/>
-              </a:effectRef>
-              <a:fontRef idx="minor">
-                <a:schemeClr val="lt1"/>
-              </a:fontRef>
-            </p:style>
-            <p:txBody>
-              <a:bodyPr rtlCol="0" anchor="ctr"/>
-              <a:lstStyle/>
-              <a:p>
-                <a:pPr algn="ctr"/>
-                <a:endParaRPr lang="zh-TW" altLang="en-US"/>
-              </a:p>
-            </p:txBody>
-          </p:sp>
-          <p:sp>
-            <p:nvSpPr>
-              <p:cNvPr id="18" name="矩形 17"/>
-              <p:cNvSpPr/>
-              <p:nvPr/>
-            </p:nvSpPr>
-            <p:spPr>
-              <a:xfrm>
-                <a:off x="8708727" y="2731477"/>
-                <a:ext cx="253218" cy="253218"/>
-              </a:xfrm>
-              <a:prstGeom prst="rect">
-                <a:avLst/>
-              </a:prstGeom>
-              <a:solidFill>
-                <a:schemeClr val="accent5"/>
-              </a:solidFill>
-              <a:ln>
-                <a:noFill/>
-              </a:ln>
-            </p:spPr>
-            <p:style>
-              <a:lnRef idx="2">
-                <a:schemeClr val="accent1">
-                  <a:shade val="50000"/>
-                </a:schemeClr>
-              </a:lnRef>
-              <a:fillRef idx="1">
-                <a:schemeClr val="accent1"/>
-              </a:fillRef>
-              <a:effectRef idx="0">
-                <a:schemeClr val="accent1"/>
-              </a:effectRef>
-              <a:fontRef idx="minor">
-                <a:schemeClr val="lt1"/>
-              </a:fontRef>
-            </p:style>
-            <p:txBody>
-              <a:bodyPr rtlCol="0" anchor="ctr"/>
-              <a:lstStyle/>
-              <a:p>
-                <a:pPr algn="ctr"/>
-                <a:endParaRPr lang="zh-TW" altLang="en-US"/>
-              </a:p>
-            </p:txBody>
-          </p:sp>
-          <p:sp>
-            <p:nvSpPr>
-              <p:cNvPr id="19" name="矩形 18"/>
-              <p:cNvSpPr/>
-              <p:nvPr/>
-            </p:nvSpPr>
-            <p:spPr>
-              <a:xfrm>
-                <a:off x="8708727" y="3055812"/>
-                <a:ext cx="253218" cy="253218"/>
-              </a:xfrm>
-              <a:prstGeom prst="rect">
-                <a:avLst/>
-              </a:prstGeom>
-              <a:solidFill>
-                <a:schemeClr val="accent5">
-                  <a:lumMod val="75000"/>
-                </a:schemeClr>
-              </a:solidFill>
-              <a:ln>
-                <a:noFill/>
-              </a:ln>
-            </p:spPr>
-            <p:style>
-              <a:lnRef idx="2">
-                <a:schemeClr val="accent1">
-                  <a:shade val="50000"/>
-                </a:schemeClr>
-              </a:lnRef>
-              <a:fillRef idx="1">
-                <a:schemeClr val="accent1"/>
-              </a:fillRef>
-              <a:effectRef idx="0">
-                <a:schemeClr val="accent1"/>
-              </a:effectRef>
-              <a:fontRef idx="minor">
-                <a:schemeClr val="lt1"/>
-              </a:fontRef>
-            </p:style>
-            <p:txBody>
-              <a:bodyPr rtlCol="0" anchor="ctr"/>
-              <a:lstStyle/>
-              <a:p>
-                <a:pPr algn="ctr"/>
-                <a:endParaRPr lang="zh-TW" altLang="en-US"/>
-              </a:p>
-            </p:txBody>
-          </p:sp>
-          <p:sp>
-            <p:nvSpPr>
-              <p:cNvPr id="20" name="矩形 19"/>
-              <p:cNvSpPr/>
-              <p:nvPr/>
-            </p:nvSpPr>
-            <p:spPr>
-              <a:xfrm>
-                <a:off x="8866169" y="3398904"/>
-                <a:ext cx="253218" cy="253218"/>
-              </a:xfrm>
-              <a:prstGeom prst="rect">
-                <a:avLst/>
-              </a:prstGeom>
-              <a:solidFill>
-                <a:schemeClr val="accent5">
-                  <a:lumMod val="50000"/>
-                </a:schemeClr>
-              </a:solidFill>
-              <a:ln>
-                <a:noFill/>
-              </a:ln>
-            </p:spPr>
-            <p:style>
-              <a:lnRef idx="2">
-                <a:schemeClr val="accent1">
-                  <a:shade val="50000"/>
-                </a:schemeClr>
-              </a:lnRef>
-              <a:fillRef idx="1">
-                <a:schemeClr val="accent1"/>
-              </a:fillRef>
-              <a:effectRef idx="0">
-                <a:schemeClr val="accent1"/>
-              </a:effectRef>
-              <a:fontRef idx="minor">
-                <a:schemeClr val="lt1"/>
-              </a:fontRef>
-            </p:style>
-            <p:txBody>
-              <a:bodyPr rtlCol="0" anchor="ctr"/>
-              <a:lstStyle/>
-              <a:p>
-                <a:pPr algn="ctr"/>
-                <a:endParaRPr lang="zh-TW" altLang="en-US"/>
-              </a:p>
-            </p:txBody>
-          </p:sp>
-          <p:sp>
-            <p:nvSpPr>
-              <p:cNvPr id="21" name="矩形 20"/>
-              <p:cNvSpPr/>
-              <p:nvPr/>
-            </p:nvSpPr>
-            <p:spPr>
-              <a:xfrm>
-                <a:off x="9875332" y="2675203"/>
-                <a:ext cx="253218" cy="253218"/>
-              </a:xfrm>
-              <a:prstGeom prst="rect">
-                <a:avLst/>
-              </a:prstGeom>
-              <a:solidFill>
-                <a:schemeClr val="accent2">
-                  <a:lumMod val="60000"/>
-                  <a:lumOff val="40000"/>
-                </a:schemeClr>
-              </a:solidFill>
-              <a:ln>
-                <a:noFill/>
-              </a:ln>
-            </p:spPr>
-            <p:style>
-              <a:lnRef idx="2">
-                <a:schemeClr val="accent1">
-                  <a:shade val="50000"/>
-                </a:schemeClr>
-              </a:lnRef>
-              <a:fillRef idx="1">
-                <a:schemeClr val="accent1"/>
-              </a:fillRef>
-              <a:effectRef idx="0">
-                <a:schemeClr val="accent1"/>
-              </a:effectRef>
-              <a:fontRef idx="minor">
-                <a:schemeClr val="lt1"/>
-              </a:fontRef>
-            </p:style>
-            <p:txBody>
-              <a:bodyPr rtlCol="0" anchor="ctr"/>
-              <a:lstStyle/>
-              <a:p>
-                <a:pPr algn="ctr"/>
-                <a:endParaRPr lang="zh-TW" altLang="en-US"/>
-              </a:p>
-            </p:txBody>
-          </p:sp>
-          <p:sp>
-            <p:nvSpPr>
-              <p:cNvPr id="22" name="矩形 21"/>
-              <p:cNvSpPr/>
-              <p:nvPr/>
-            </p:nvSpPr>
-            <p:spPr>
-              <a:xfrm>
-                <a:off x="10219304" y="2984695"/>
-                <a:ext cx="253218" cy="253218"/>
-              </a:xfrm>
-              <a:prstGeom prst="rect">
-                <a:avLst/>
-              </a:prstGeom>
-              <a:solidFill>
-                <a:schemeClr val="accent2">
-                  <a:lumMod val="50000"/>
-                </a:schemeClr>
-              </a:solidFill>
-              <a:ln>
-                <a:noFill/>
-              </a:ln>
-            </p:spPr>
-            <p:style>
-              <a:lnRef idx="2">
-                <a:schemeClr val="accent1">
-                  <a:shade val="50000"/>
-                </a:schemeClr>
-              </a:lnRef>
-              <a:fillRef idx="1">
-                <a:schemeClr val="accent1"/>
-              </a:fillRef>
-              <a:effectRef idx="0">
-                <a:schemeClr val="accent1"/>
-              </a:effectRef>
-              <a:fontRef idx="minor">
-                <a:schemeClr val="lt1"/>
-              </a:fontRef>
-            </p:style>
-            <p:txBody>
-              <a:bodyPr rtlCol="0" anchor="ctr"/>
-              <a:lstStyle/>
-              <a:p>
-                <a:pPr algn="ctr"/>
-                <a:endParaRPr lang="zh-TW" altLang="en-US"/>
-              </a:p>
-            </p:txBody>
-          </p:sp>
-        </p:grpSp>
-        <p:cxnSp>
-          <p:nvCxnSpPr>
-            <p:cNvPr id="26" name="直線單箭頭接點 25"/>
-            <p:cNvCxnSpPr/>
-            <p:nvPr/>
-          </p:nvCxnSpPr>
-          <p:spPr>
-            <a:xfrm>
-              <a:off x="5992839" y="2586502"/>
-              <a:ext cx="872197" cy="0"/>
-            </a:xfrm>
-            <a:prstGeom prst="straightConnector1">
-              <a:avLst/>
-            </a:prstGeom>
-            <a:ln w="63500">
-              <a:solidFill>
-                <a:schemeClr val="tx1"/>
-              </a:solidFill>
-              <a:tailEnd type="triangle"/>
-            </a:ln>
-          </p:spPr>
-          <p:style>
-            <a:lnRef idx="1">
-              <a:schemeClr val="accent1"/>
-            </a:lnRef>
-            <a:fillRef idx="0">
-              <a:schemeClr val="accent1"/>
-            </a:fillRef>
-            <a:effectRef idx="0">
-              <a:schemeClr val="accent1"/>
-            </a:effectRef>
-            <a:fontRef idx="minor">
-              <a:schemeClr val="tx1"/>
-            </a:fontRef>
-          </p:style>
-        </p:cxnSp>
-        <p:sp>
-          <p:nvSpPr>
-            <p:cNvPr id="27" name="文字方塊 26"/>
-            <p:cNvSpPr txBox="1"/>
-            <p:nvPr/>
-          </p:nvSpPr>
-          <p:spPr>
-            <a:xfrm>
-              <a:off x="5852159" y="2663473"/>
-              <a:ext cx="1098314" cy="369332"/>
-            </a:xfrm>
-            <a:prstGeom prst="rect">
-              <a:avLst/>
-            </a:prstGeom>
-            <a:noFill/>
-          </p:spPr>
-          <p:txBody>
-            <a:bodyPr wrap="none" rtlCol="0">
-              <a:spAutoFit/>
-            </a:bodyPr>
-            <a:lstStyle/>
-            <a:p>
-              <a:r>
-                <a:rPr lang="en-US" altLang="zh-TW" dirty="0" smtClean="0"/>
-                <a:t>rearrange</a:t>
-              </a:r>
-              <a:endParaRPr lang="zh-TW" altLang="en-US" dirty="0"/>
-            </a:p>
-          </p:txBody>
-        </p:sp>
-        <p:sp>
-          <p:nvSpPr>
-            <p:cNvPr id="28" name="文字方塊 27"/>
-            <p:cNvSpPr txBox="1"/>
-            <p:nvPr/>
-          </p:nvSpPr>
-          <p:spPr>
-            <a:xfrm>
-              <a:off x="7323980" y="4079948"/>
-              <a:ext cx="3658759" cy="369332"/>
-            </a:xfrm>
-            <a:prstGeom prst="rect">
-              <a:avLst/>
-            </a:prstGeom>
-            <a:noFill/>
-          </p:spPr>
-          <p:txBody>
-            <a:bodyPr wrap="none" rtlCol="0">
-              <a:spAutoFit/>
-            </a:bodyPr>
-            <a:lstStyle/>
-            <a:p>
-              <a:r>
-                <a:rPr lang="en-US" altLang="zh-TW" dirty="0" smtClean="0"/>
-                <a:t>Press </a:t>
-              </a:r>
-              <a:r>
-                <a:rPr lang="en-US" altLang="zh-TW" b="1" dirty="0" smtClean="0"/>
-                <a:t>spacebar</a:t>
-              </a:r>
-              <a:r>
-                <a:rPr lang="en-US" altLang="zh-TW" dirty="0" smtClean="0"/>
-                <a:t> to finish arrangement</a:t>
-              </a:r>
-              <a:endParaRPr lang="zh-TW" altLang="en-US" dirty="0"/>
-            </a:p>
-          </p:txBody>
-        </p:sp>
-        <p:sp>
-          <p:nvSpPr>
-            <p:cNvPr id="29" name="文字方塊 28"/>
-            <p:cNvSpPr txBox="1"/>
-            <p:nvPr/>
-          </p:nvSpPr>
-          <p:spPr>
-            <a:xfrm>
-              <a:off x="3347480" y="4065554"/>
-              <a:ext cx="710451" cy="369332"/>
-            </a:xfrm>
-            <a:prstGeom prst="rect">
-              <a:avLst/>
-            </a:prstGeom>
-            <a:noFill/>
-          </p:spPr>
-          <p:txBody>
-            <a:bodyPr wrap="none" rtlCol="0">
-              <a:spAutoFit/>
-            </a:bodyPr>
-            <a:lstStyle/>
-            <a:p>
-              <a:r>
-                <a:rPr lang="en-US" altLang="zh-TW" dirty="0" smtClean="0"/>
-                <a:t>Initial</a:t>
-              </a:r>
-            </a:p>
-          </p:txBody>
-        </p:sp>
-      </p:grpSp>
-    </p:spTree>
-    <p:extLst>
-      <p:ext uri="{BB962C8B-B14F-4D97-AF65-F5344CB8AC3E}">
-        <p14:creationId xmlns:p14="http://schemas.microsoft.com/office/powerpoint/2010/main" val="3033638110"/>
-      </p:ext>
-    </p:extLst>
-  </p:cSld>
-  <p:clrMapOvr>
-    <a:masterClrMapping/>
-  </p:clrMapOvr>
-</p:sld>
-</file>
-
-<file path=ppt/slides/slide2.xml><?xml version="1.0" encoding="utf-8"?>
-<p:sld xmlns:a="http://schemas.openxmlformats.org/drawingml/2006/main" xmlns:r="http://schemas.openxmlformats.org/officeDocument/2006/relationships" xmlns:p="http://schemas.openxmlformats.org/presentationml/2006/main">
-  <p:cSld>
-    <p:spTree>
-      <p:nvGrpSpPr>
-        <p:cNvPr id="1" name=""/>
-        <p:cNvGrpSpPr/>
-        <p:nvPr/>
-      </p:nvGrpSpPr>
-      <p:grpSpPr>
-        <a:xfrm>
-          <a:off x="0" y="0"/>
-          <a:ext cx="0" cy="0"/>
-          <a:chOff x="0" y="0"/>
-          <a:chExt cx="0" cy="0"/>
-        </a:xfrm>
-      </p:grpSpPr>
-      <p:grpSp>
-        <p:nvGrpSpPr>
-          <p:cNvPr id="59" name="群組 58"/>
-          <p:cNvGrpSpPr/>
-          <p:nvPr/>
-        </p:nvGrpSpPr>
-        <p:grpSpPr>
-          <a:xfrm>
-            <a:off x="1822310" y="1243435"/>
+            <a:off x="1206372" y="2182041"/>
             <a:ext cx="3902893" cy="2686137"/>
-            <a:chOff x="1822310" y="1243435"/>
+            <a:chOff x="1133341" y="1210613"/>
             <a:chExt cx="3902893" cy="2686137"/>
           </a:xfrm>
         </p:grpSpPr>
@@ -4051,7 +2991,7 @@
           </p:nvSpPr>
           <p:spPr>
             <a:xfrm>
-              <a:off x="1822310" y="1243435"/>
+              <a:off x="1133341" y="1210613"/>
               <a:ext cx="3902893" cy="2686137"/>
             </a:xfrm>
             <a:prstGeom prst="rect">
@@ -4063,53 +3003,9 @@
               </a:schemeClr>
             </a:solidFill>
             <a:ln>
-              <a:noFill/>
-            </a:ln>
-          </p:spPr>
-          <p:style>
-            <a:lnRef idx="2">
-              <a:schemeClr val="accent1">
-                <a:shade val="50000"/>
-              </a:schemeClr>
-            </a:lnRef>
-            <a:fillRef idx="1">
-              <a:schemeClr val="accent1"/>
-            </a:fillRef>
-            <a:effectRef idx="0">
-              <a:schemeClr val="accent1"/>
-            </a:effectRef>
-            <a:fontRef idx="minor">
-              <a:schemeClr val="lt1"/>
-            </a:fontRef>
-          </p:style>
-          <p:txBody>
-            <a:bodyPr rtlCol="0" anchor="ctr"/>
-            <a:lstStyle/>
-            <a:p>
-              <a:pPr algn="ctr"/>
-              <a:endParaRPr lang="zh-TW" altLang="en-US" dirty="0"/>
-            </a:p>
-          </p:txBody>
-        </p:sp>
-        <p:sp>
-          <p:nvSpPr>
-            <p:cNvPr id="5" name="矩形 4"/>
-            <p:cNvSpPr/>
-            <p:nvPr/>
-          </p:nvSpPr>
-          <p:spPr>
-            <a:xfrm>
-              <a:off x="3105375" y="2086705"/>
-              <a:ext cx="253218" cy="253218"/>
-            </a:xfrm>
-            <a:prstGeom prst="rect">
-              <a:avLst/>
-            </a:prstGeom>
-            <a:solidFill>
-              <a:srgbClr val="FF0000"/>
-            </a:solidFill>
-            <a:ln>
-              <a:noFill/>
+              <a:solidFill>
+                <a:schemeClr val="tx1"/>
+              </a:solidFill>
             </a:ln>
           </p:spPr>
           <p:style>
@@ -4145,20 +3041,19 @@
           </p:nvSpPr>
           <p:spPr>
             <a:xfrm>
-              <a:off x="4288680" y="2086705"/>
+              <a:off x="2831569" y="1842868"/>
               <a:ext cx="253218" cy="253218"/>
             </a:xfrm>
             <a:prstGeom prst="rect">
               <a:avLst/>
             </a:prstGeom>
             <a:solidFill>
-              <a:schemeClr val="accent2">
-                <a:lumMod val="60000"/>
-                <a:lumOff val="40000"/>
-              </a:schemeClr>
+              <a:srgbClr val="FF0000"/>
             </a:solidFill>
-            <a:ln>
-              <a:noFill/>
+            <a:ln w="25400">
+              <a:solidFill>
+                <a:schemeClr val="tx1"/>
+              </a:solidFill>
             </a:ln>
           </p:spPr>
           <p:style>
@@ -4186,732 +3081,870 @@
             </a:p>
           </p:txBody>
         </p:sp>
-        <p:grpSp>
-          <p:nvGrpSpPr>
-            <p:cNvPr id="56" name="群組 55"/>
-            <p:cNvGrpSpPr/>
-            <p:nvPr/>
-          </p:nvGrpSpPr>
-          <p:grpSpPr>
-            <a:xfrm>
-              <a:off x="2152152" y="2550940"/>
-              <a:ext cx="3269571" cy="713572"/>
-              <a:chOff x="7009816" y="2339923"/>
-              <a:chExt cx="4213654" cy="919615"/>
-            </a:xfrm>
-          </p:grpSpPr>
-          <p:cxnSp>
-            <p:nvCxnSpPr>
-              <p:cNvPr id="23" name="直線接點 22"/>
-              <p:cNvCxnSpPr/>
-              <p:nvPr/>
-            </p:nvCxnSpPr>
-            <p:spPr>
-              <a:xfrm>
-                <a:off x="7202658" y="2527495"/>
-                <a:ext cx="3826413" cy="0"/>
-              </a:xfrm>
-              <a:prstGeom prst="line">
-                <a:avLst/>
-              </a:prstGeom>
-              <a:ln w="25400">
-                <a:solidFill>
-                  <a:schemeClr val="tx1"/>
-                </a:solidFill>
-              </a:ln>
-            </p:spPr>
-            <p:style>
-              <a:lnRef idx="1">
-                <a:schemeClr val="accent1"/>
-              </a:lnRef>
-              <a:fillRef idx="0">
-                <a:schemeClr val="accent1"/>
-              </a:fillRef>
-              <a:effectRef idx="0">
-                <a:schemeClr val="accent1"/>
-              </a:effectRef>
-              <a:fontRef idx="minor">
-                <a:schemeClr val="tx1"/>
-              </a:fontRef>
-            </p:style>
-          </p:cxnSp>
-          <p:grpSp>
-            <p:nvGrpSpPr>
-              <p:cNvPr id="45" name="群組 44"/>
-              <p:cNvGrpSpPr/>
-              <p:nvPr/>
-            </p:nvGrpSpPr>
-            <p:grpSpPr>
-              <a:xfrm>
-                <a:off x="7202658" y="2339923"/>
-                <a:ext cx="3826413" cy="379830"/>
-                <a:chOff x="7202658" y="2246141"/>
-                <a:chExt cx="3826413" cy="567394"/>
-              </a:xfrm>
-            </p:grpSpPr>
-            <p:cxnSp>
-              <p:nvCxnSpPr>
-                <p:cNvPr id="25" name="直線接點 24"/>
-                <p:cNvCxnSpPr/>
-                <p:nvPr/>
-              </p:nvCxnSpPr>
-              <p:spPr>
-                <a:xfrm>
-                  <a:off x="7202658" y="2246141"/>
-                  <a:ext cx="0" cy="567394"/>
-                </a:xfrm>
-                <a:prstGeom prst="line">
-                  <a:avLst/>
-                </a:prstGeom>
-                <a:ln w="25400">
-                  <a:solidFill>
-                    <a:schemeClr val="tx1"/>
-                  </a:solidFill>
-                </a:ln>
-              </p:spPr>
-              <p:style>
-                <a:lnRef idx="1">
-                  <a:schemeClr val="accent1"/>
-                </a:lnRef>
-                <a:fillRef idx="0">
-                  <a:schemeClr val="accent1"/>
-                </a:fillRef>
-                <a:effectRef idx="0">
-                  <a:schemeClr val="accent1"/>
-                </a:effectRef>
-                <a:fontRef idx="minor">
-                  <a:schemeClr val="tx1"/>
-                </a:fontRef>
-              </p:style>
-            </p:cxnSp>
-            <p:cxnSp>
-              <p:nvCxnSpPr>
-                <p:cNvPr id="26" name="直線接點 25"/>
-                <p:cNvCxnSpPr/>
-                <p:nvPr/>
-              </p:nvCxnSpPr>
-              <p:spPr>
-                <a:xfrm>
-                  <a:off x="7680960" y="2246141"/>
-                  <a:ext cx="0" cy="567394"/>
-                </a:xfrm>
-                <a:prstGeom prst="line">
-                  <a:avLst/>
-                </a:prstGeom>
-                <a:ln w="25400">
-                  <a:solidFill>
-                    <a:schemeClr val="tx1"/>
-                  </a:solidFill>
-                </a:ln>
-              </p:spPr>
-              <p:style>
-                <a:lnRef idx="1">
-                  <a:schemeClr val="accent1"/>
-                </a:lnRef>
-                <a:fillRef idx="0">
-                  <a:schemeClr val="accent1"/>
-                </a:fillRef>
-                <a:effectRef idx="0">
-                  <a:schemeClr val="accent1"/>
-                </a:effectRef>
-                <a:fontRef idx="minor">
-                  <a:schemeClr val="tx1"/>
-                </a:fontRef>
-              </p:style>
-            </p:cxnSp>
-            <p:cxnSp>
-              <p:nvCxnSpPr>
-                <p:cNvPr id="27" name="直線接點 26"/>
-                <p:cNvCxnSpPr/>
-                <p:nvPr/>
-              </p:nvCxnSpPr>
-              <p:spPr>
-                <a:xfrm>
-                  <a:off x="8159262" y="2246141"/>
-                  <a:ext cx="0" cy="567394"/>
-                </a:xfrm>
-                <a:prstGeom prst="line">
-                  <a:avLst/>
-                </a:prstGeom>
-                <a:ln w="25400">
-                  <a:solidFill>
-                    <a:schemeClr val="tx1"/>
-                  </a:solidFill>
-                </a:ln>
-              </p:spPr>
-              <p:style>
-                <a:lnRef idx="1">
-                  <a:schemeClr val="accent1"/>
-                </a:lnRef>
-                <a:fillRef idx="0">
-                  <a:schemeClr val="accent1"/>
-                </a:fillRef>
-                <a:effectRef idx="0">
-                  <a:schemeClr val="accent1"/>
-                </a:effectRef>
-                <a:fontRef idx="minor">
-                  <a:schemeClr val="tx1"/>
-                </a:fontRef>
-              </p:style>
-            </p:cxnSp>
-            <p:cxnSp>
-              <p:nvCxnSpPr>
-                <p:cNvPr id="28" name="直線接點 27"/>
-                <p:cNvCxnSpPr/>
-                <p:nvPr/>
-              </p:nvCxnSpPr>
-              <p:spPr>
-                <a:xfrm>
-                  <a:off x="8637564" y="2246141"/>
-                  <a:ext cx="0" cy="567394"/>
-                </a:xfrm>
-                <a:prstGeom prst="line">
-                  <a:avLst/>
-                </a:prstGeom>
-                <a:ln w="25400">
-                  <a:solidFill>
-                    <a:schemeClr val="tx1"/>
-                  </a:solidFill>
-                </a:ln>
-              </p:spPr>
-              <p:style>
-                <a:lnRef idx="1">
-                  <a:schemeClr val="accent1"/>
-                </a:lnRef>
-                <a:fillRef idx="0">
-                  <a:schemeClr val="accent1"/>
-                </a:fillRef>
-                <a:effectRef idx="0">
-                  <a:schemeClr val="accent1"/>
-                </a:effectRef>
-                <a:fontRef idx="minor">
-                  <a:schemeClr val="tx1"/>
-                </a:fontRef>
-              </p:style>
-            </p:cxnSp>
-            <p:cxnSp>
-              <p:nvCxnSpPr>
-                <p:cNvPr id="29" name="直線接點 28"/>
-                <p:cNvCxnSpPr/>
-                <p:nvPr/>
-              </p:nvCxnSpPr>
-              <p:spPr>
-                <a:xfrm>
-                  <a:off x="9115866" y="2246141"/>
-                  <a:ext cx="0" cy="567394"/>
-                </a:xfrm>
-                <a:prstGeom prst="line">
-                  <a:avLst/>
-                </a:prstGeom>
-                <a:ln w="25400">
-                  <a:solidFill>
-                    <a:schemeClr val="tx1"/>
-                  </a:solidFill>
-                </a:ln>
-              </p:spPr>
-              <p:style>
-                <a:lnRef idx="1">
-                  <a:schemeClr val="accent1"/>
-                </a:lnRef>
-                <a:fillRef idx="0">
-                  <a:schemeClr val="accent1"/>
-                </a:fillRef>
-                <a:effectRef idx="0">
-                  <a:schemeClr val="accent1"/>
-                </a:effectRef>
-                <a:fontRef idx="minor">
-                  <a:schemeClr val="tx1"/>
-                </a:fontRef>
-              </p:style>
-            </p:cxnSp>
-            <p:cxnSp>
-              <p:nvCxnSpPr>
-                <p:cNvPr id="30" name="直線接點 29"/>
-                <p:cNvCxnSpPr/>
-                <p:nvPr/>
-              </p:nvCxnSpPr>
-              <p:spPr>
-                <a:xfrm>
-                  <a:off x="9594168" y="2246141"/>
-                  <a:ext cx="0" cy="567394"/>
-                </a:xfrm>
-                <a:prstGeom prst="line">
-                  <a:avLst/>
-                </a:prstGeom>
-                <a:ln w="25400">
-                  <a:solidFill>
-                    <a:schemeClr val="tx1"/>
-                  </a:solidFill>
-                </a:ln>
-              </p:spPr>
-              <p:style>
-                <a:lnRef idx="1">
-                  <a:schemeClr val="accent1"/>
-                </a:lnRef>
-                <a:fillRef idx="0">
-                  <a:schemeClr val="accent1"/>
-                </a:fillRef>
-                <a:effectRef idx="0">
-                  <a:schemeClr val="accent1"/>
-                </a:effectRef>
-                <a:fontRef idx="minor">
-                  <a:schemeClr val="tx1"/>
-                </a:fontRef>
-              </p:style>
-            </p:cxnSp>
-            <p:cxnSp>
-              <p:nvCxnSpPr>
-                <p:cNvPr id="31" name="直線接點 30"/>
-                <p:cNvCxnSpPr/>
-                <p:nvPr/>
-              </p:nvCxnSpPr>
-              <p:spPr>
-                <a:xfrm>
-                  <a:off x="10072470" y="2246141"/>
-                  <a:ext cx="0" cy="567394"/>
-                </a:xfrm>
-                <a:prstGeom prst="line">
-                  <a:avLst/>
-                </a:prstGeom>
-                <a:ln w="25400">
-                  <a:solidFill>
-                    <a:schemeClr val="tx1"/>
-                  </a:solidFill>
-                </a:ln>
-              </p:spPr>
-              <p:style>
-                <a:lnRef idx="1">
-                  <a:schemeClr val="accent1"/>
-                </a:lnRef>
-                <a:fillRef idx="0">
-                  <a:schemeClr val="accent1"/>
-                </a:fillRef>
-                <a:effectRef idx="0">
-                  <a:schemeClr val="accent1"/>
-                </a:effectRef>
-                <a:fontRef idx="minor">
-                  <a:schemeClr val="tx1"/>
-                </a:fontRef>
-              </p:style>
-            </p:cxnSp>
-            <p:cxnSp>
-              <p:nvCxnSpPr>
-                <p:cNvPr id="32" name="直線接點 31"/>
-                <p:cNvCxnSpPr/>
-                <p:nvPr/>
-              </p:nvCxnSpPr>
-              <p:spPr>
-                <a:xfrm>
-                  <a:off x="10550772" y="2246141"/>
-                  <a:ext cx="0" cy="567394"/>
-                </a:xfrm>
-                <a:prstGeom prst="line">
-                  <a:avLst/>
-                </a:prstGeom>
-                <a:ln w="25400">
-                  <a:solidFill>
-                    <a:schemeClr val="tx1"/>
-                  </a:solidFill>
-                </a:ln>
-              </p:spPr>
-              <p:style>
-                <a:lnRef idx="1">
-                  <a:schemeClr val="accent1"/>
-                </a:lnRef>
-                <a:fillRef idx="0">
-                  <a:schemeClr val="accent1"/>
-                </a:fillRef>
-                <a:effectRef idx="0">
-                  <a:schemeClr val="accent1"/>
-                </a:effectRef>
-                <a:fontRef idx="minor">
-                  <a:schemeClr val="tx1"/>
-                </a:fontRef>
-              </p:style>
-            </p:cxnSp>
-            <p:cxnSp>
-              <p:nvCxnSpPr>
-                <p:cNvPr id="33" name="直線接點 32"/>
-                <p:cNvCxnSpPr/>
-                <p:nvPr/>
-              </p:nvCxnSpPr>
-              <p:spPr>
-                <a:xfrm>
-                  <a:off x="11029071" y="2246141"/>
-                  <a:ext cx="0" cy="567394"/>
-                </a:xfrm>
-                <a:prstGeom prst="line">
-                  <a:avLst/>
-                </a:prstGeom>
-                <a:ln w="25400">
-                  <a:solidFill>
-                    <a:schemeClr val="tx1"/>
-                  </a:solidFill>
-                </a:ln>
-              </p:spPr>
-              <p:style>
-                <a:lnRef idx="1">
-                  <a:schemeClr val="accent1"/>
-                </a:lnRef>
-                <a:fillRef idx="0">
-                  <a:schemeClr val="accent1"/>
-                </a:fillRef>
-                <a:effectRef idx="0">
-                  <a:schemeClr val="accent1"/>
-                </a:effectRef>
-                <a:fontRef idx="minor">
-                  <a:schemeClr val="tx1"/>
-                </a:fontRef>
-              </p:style>
-            </p:cxnSp>
-          </p:grpSp>
-          <p:sp>
-            <p:nvSpPr>
-              <p:cNvPr id="46" name="文字方塊 45"/>
-              <p:cNvSpPr txBox="1"/>
-              <p:nvPr/>
-            </p:nvSpPr>
-            <p:spPr>
-              <a:xfrm>
-                <a:off x="7009816" y="2783562"/>
-                <a:ext cx="388797" cy="475976"/>
-              </a:xfrm>
-              <a:prstGeom prst="rect">
-                <a:avLst/>
-              </a:prstGeom>
-              <a:noFill/>
-            </p:spPr>
-            <p:txBody>
-              <a:bodyPr wrap="none" rtlCol="0">
-                <a:spAutoFit/>
-              </a:bodyPr>
-              <a:lstStyle/>
-              <a:p>
-                <a:pPr algn="ctr"/>
-                <a:r>
-                  <a:rPr lang="en-US" altLang="zh-TW" dirty="0" smtClean="0"/>
-                  <a:t>1</a:t>
-                </a:r>
-                <a:endParaRPr lang="zh-TW" altLang="en-US" dirty="0"/>
-              </a:p>
-            </p:txBody>
-          </p:sp>
-          <p:sp>
-            <p:nvSpPr>
-              <p:cNvPr id="47" name="文字方塊 46"/>
-              <p:cNvSpPr txBox="1"/>
-              <p:nvPr/>
-            </p:nvSpPr>
-            <p:spPr>
-              <a:xfrm>
-                <a:off x="7487924" y="2783562"/>
-                <a:ext cx="388797" cy="475976"/>
-              </a:xfrm>
-              <a:prstGeom prst="rect">
-                <a:avLst/>
-              </a:prstGeom>
-              <a:noFill/>
-            </p:spPr>
-            <p:txBody>
-              <a:bodyPr wrap="none" rtlCol="0">
-                <a:spAutoFit/>
-              </a:bodyPr>
-              <a:lstStyle/>
-              <a:p>
-                <a:pPr algn="ctr"/>
-                <a:r>
-                  <a:rPr lang="en-US" altLang="zh-TW" dirty="0" smtClean="0"/>
-                  <a:t>2</a:t>
-                </a:r>
-                <a:endParaRPr lang="zh-TW" altLang="en-US" dirty="0"/>
-              </a:p>
-            </p:txBody>
-          </p:sp>
-          <p:sp>
-            <p:nvSpPr>
-              <p:cNvPr id="48" name="文字方塊 47"/>
-              <p:cNvSpPr txBox="1"/>
-              <p:nvPr/>
-            </p:nvSpPr>
-            <p:spPr>
-              <a:xfrm>
-                <a:off x="7966030" y="2783562"/>
-                <a:ext cx="388797" cy="475976"/>
-              </a:xfrm>
-              <a:prstGeom prst="rect">
-                <a:avLst/>
-              </a:prstGeom>
-              <a:noFill/>
-            </p:spPr>
-            <p:txBody>
-              <a:bodyPr wrap="none" rtlCol="0">
-                <a:spAutoFit/>
-              </a:bodyPr>
-              <a:lstStyle/>
-              <a:p>
-                <a:pPr algn="ctr"/>
-                <a:r>
-                  <a:rPr lang="en-US" altLang="zh-TW" dirty="0" smtClean="0"/>
-                  <a:t>3</a:t>
-                </a:r>
-                <a:endParaRPr lang="zh-TW" altLang="en-US" dirty="0"/>
-              </a:p>
-            </p:txBody>
-          </p:sp>
-          <p:sp>
-            <p:nvSpPr>
-              <p:cNvPr id="49" name="文字方塊 48"/>
-              <p:cNvSpPr txBox="1"/>
-              <p:nvPr/>
-            </p:nvSpPr>
-            <p:spPr>
-              <a:xfrm>
-                <a:off x="8444137" y="2783562"/>
-                <a:ext cx="388797" cy="475976"/>
-              </a:xfrm>
-              <a:prstGeom prst="rect">
-                <a:avLst/>
-              </a:prstGeom>
-              <a:noFill/>
-            </p:spPr>
-            <p:txBody>
-              <a:bodyPr wrap="none" rtlCol="0">
-                <a:spAutoFit/>
-              </a:bodyPr>
-              <a:lstStyle/>
-              <a:p>
-                <a:pPr algn="ctr"/>
-                <a:r>
-                  <a:rPr lang="en-US" altLang="zh-TW" dirty="0" smtClean="0"/>
-                  <a:t>4</a:t>
-                </a:r>
-                <a:endParaRPr lang="zh-TW" altLang="en-US" dirty="0"/>
-              </a:p>
-            </p:txBody>
-          </p:sp>
-          <p:sp>
-            <p:nvSpPr>
-              <p:cNvPr id="50" name="文字方塊 49"/>
-              <p:cNvSpPr txBox="1"/>
-              <p:nvPr/>
-            </p:nvSpPr>
-            <p:spPr>
-              <a:xfrm>
-                <a:off x="8922244" y="2783562"/>
-                <a:ext cx="388797" cy="475976"/>
-              </a:xfrm>
-              <a:prstGeom prst="rect">
-                <a:avLst/>
-              </a:prstGeom>
-              <a:noFill/>
-            </p:spPr>
-            <p:txBody>
-              <a:bodyPr wrap="none" rtlCol="0">
-                <a:spAutoFit/>
-              </a:bodyPr>
-              <a:lstStyle/>
-              <a:p>
-                <a:pPr algn="ctr"/>
-                <a:r>
-                  <a:rPr lang="en-US" altLang="zh-TW" dirty="0" smtClean="0"/>
-                  <a:t>5</a:t>
-                </a:r>
-                <a:endParaRPr lang="zh-TW" altLang="en-US" dirty="0"/>
-              </a:p>
-            </p:txBody>
-          </p:sp>
-          <p:sp>
-            <p:nvSpPr>
-              <p:cNvPr id="51" name="文字方塊 50"/>
-              <p:cNvSpPr txBox="1"/>
-              <p:nvPr/>
-            </p:nvSpPr>
-            <p:spPr>
-              <a:xfrm>
-                <a:off x="9400351" y="2783562"/>
-                <a:ext cx="388797" cy="475976"/>
-              </a:xfrm>
-              <a:prstGeom prst="rect">
-                <a:avLst/>
-              </a:prstGeom>
-              <a:noFill/>
-            </p:spPr>
-            <p:txBody>
-              <a:bodyPr wrap="none" rtlCol="0">
-                <a:spAutoFit/>
-              </a:bodyPr>
-              <a:lstStyle/>
-              <a:p>
-                <a:pPr algn="ctr"/>
-                <a:r>
-                  <a:rPr lang="en-US" altLang="zh-TW" dirty="0" smtClean="0"/>
-                  <a:t>6</a:t>
-                </a:r>
-                <a:endParaRPr lang="zh-TW" altLang="en-US" dirty="0"/>
-              </a:p>
-            </p:txBody>
-          </p:sp>
-          <p:sp>
-            <p:nvSpPr>
-              <p:cNvPr id="52" name="文字方塊 51"/>
-              <p:cNvSpPr txBox="1"/>
-              <p:nvPr/>
-            </p:nvSpPr>
-            <p:spPr>
-              <a:xfrm>
-                <a:off x="9878459" y="2783562"/>
-                <a:ext cx="388797" cy="475976"/>
-              </a:xfrm>
-              <a:prstGeom prst="rect">
-                <a:avLst/>
-              </a:prstGeom>
-              <a:noFill/>
-            </p:spPr>
-            <p:txBody>
-              <a:bodyPr wrap="none" rtlCol="0">
-                <a:spAutoFit/>
-              </a:bodyPr>
-              <a:lstStyle/>
-              <a:p>
-                <a:pPr algn="ctr"/>
-                <a:r>
-                  <a:rPr lang="en-US" altLang="zh-TW" dirty="0" smtClean="0"/>
-                  <a:t>7</a:t>
-                </a:r>
-                <a:endParaRPr lang="zh-TW" altLang="en-US" dirty="0"/>
-              </a:p>
-            </p:txBody>
-          </p:sp>
-          <p:sp>
-            <p:nvSpPr>
-              <p:cNvPr id="53" name="文字方塊 52"/>
-              <p:cNvSpPr txBox="1"/>
-              <p:nvPr/>
-            </p:nvSpPr>
-            <p:spPr>
-              <a:xfrm>
-                <a:off x="10356565" y="2783562"/>
-                <a:ext cx="388797" cy="475976"/>
-              </a:xfrm>
-              <a:prstGeom prst="rect">
-                <a:avLst/>
-              </a:prstGeom>
-              <a:noFill/>
-            </p:spPr>
-            <p:txBody>
-              <a:bodyPr wrap="none" rtlCol="0">
-                <a:spAutoFit/>
-              </a:bodyPr>
-              <a:lstStyle/>
-              <a:p>
-                <a:pPr algn="ctr"/>
-                <a:r>
-                  <a:rPr lang="en-US" altLang="zh-TW" dirty="0" smtClean="0"/>
-                  <a:t>8</a:t>
-                </a:r>
-                <a:endParaRPr lang="zh-TW" altLang="en-US" dirty="0"/>
-              </a:p>
-            </p:txBody>
-          </p:sp>
-          <p:sp>
-            <p:nvSpPr>
-              <p:cNvPr id="54" name="文字方塊 53"/>
-              <p:cNvSpPr txBox="1"/>
-              <p:nvPr/>
-            </p:nvSpPr>
-            <p:spPr>
-              <a:xfrm>
-                <a:off x="10834673" y="2783562"/>
-                <a:ext cx="388797" cy="475976"/>
-              </a:xfrm>
-              <a:prstGeom prst="rect">
-                <a:avLst/>
-              </a:prstGeom>
-              <a:noFill/>
-            </p:spPr>
-            <p:txBody>
-              <a:bodyPr wrap="none" rtlCol="0">
-                <a:spAutoFit/>
-              </a:bodyPr>
-              <a:lstStyle/>
-              <a:p>
-                <a:pPr algn="ctr"/>
-                <a:r>
-                  <a:rPr lang="en-US" altLang="zh-TW" dirty="0"/>
-                  <a:t>9</a:t>
-                </a:r>
-                <a:endParaRPr lang="zh-TW" altLang="en-US" dirty="0"/>
-              </a:p>
-            </p:txBody>
-          </p:sp>
-        </p:grpSp>
         <p:sp>
           <p:nvSpPr>
-            <p:cNvPr id="57" name="文字方塊 56"/>
-            <p:cNvSpPr txBox="1"/>
+            <p:cNvPr id="7" name="矩形 6"/>
+            <p:cNvSpPr/>
             <p:nvPr/>
           </p:nvSpPr>
           <p:spPr>
             <a:xfrm>
-              <a:off x="1888899" y="3202231"/>
-              <a:ext cx="1072730" cy="369332"/>
+              <a:off x="2820817" y="3097238"/>
+              <a:ext cx="253218" cy="253218"/>
+            </a:xfrm>
+            <a:prstGeom prst="rect">
+              <a:avLst/>
+            </a:prstGeom>
+            <a:solidFill>
+              <a:srgbClr val="FFFF00"/>
+            </a:solidFill>
+            <a:ln w="25400">
+              <a:solidFill>
+                <a:schemeClr val="tx1"/>
+              </a:solidFill>
+            </a:ln>
+          </p:spPr>
+          <p:style>
+            <a:lnRef idx="2">
+              <a:schemeClr val="accent1">
+                <a:shade val="50000"/>
+              </a:schemeClr>
+            </a:lnRef>
+            <a:fillRef idx="1">
+              <a:schemeClr val="accent1"/>
+            </a:fillRef>
+            <a:effectRef idx="0">
+              <a:schemeClr val="accent1"/>
+            </a:effectRef>
+            <a:fontRef idx="minor">
+              <a:schemeClr val="lt1"/>
+            </a:fontRef>
+          </p:style>
+          <p:txBody>
+            <a:bodyPr rtlCol="0" anchor="ctr"/>
+            <a:lstStyle/>
+            <a:p>
+              <a:pPr algn="ctr"/>
+              <a:endParaRPr lang="zh-TW" altLang="en-US"/>
+            </a:p>
+          </p:txBody>
+        </p:sp>
+        <p:sp>
+          <p:nvSpPr>
+            <p:cNvPr id="8" name="矩形 7"/>
+            <p:cNvSpPr/>
+            <p:nvPr/>
+          </p:nvSpPr>
+          <p:spPr>
+            <a:xfrm>
+              <a:off x="2272707" y="2242485"/>
+              <a:ext cx="253218" cy="253218"/>
+            </a:xfrm>
+            <a:prstGeom prst="rect">
+              <a:avLst/>
+            </a:prstGeom>
+            <a:solidFill>
+              <a:schemeClr val="accent6">
+                <a:lumMod val="60000"/>
+                <a:lumOff val="40000"/>
+              </a:schemeClr>
+            </a:solidFill>
+            <a:ln w="25400">
+              <a:solidFill>
+                <a:schemeClr val="tx1"/>
+              </a:solidFill>
+            </a:ln>
+          </p:spPr>
+          <p:style>
+            <a:lnRef idx="2">
+              <a:schemeClr val="accent1">
+                <a:shade val="50000"/>
+              </a:schemeClr>
+            </a:lnRef>
+            <a:fillRef idx="1">
+              <a:schemeClr val="accent1"/>
+            </a:fillRef>
+            <a:effectRef idx="0">
+              <a:schemeClr val="accent1"/>
+            </a:effectRef>
+            <a:fontRef idx="minor">
+              <a:schemeClr val="lt1"/>
+            </a:fontRef>
+          </p:style>
+          <p:txBody>
+            <a:bodyPr rtlCol="0" anchor="ctr"/>
+            <a:lstStyle/>
+            <a:p>
+              <a:pPr algn="ctr"/>
+              <a:endParaRPr lang="zh-TW" altLang="en-US"/>
+            </a:p>
+          </p:txBody>
+        </p:sp>
+        <p:sp>
+          <p:nvSpPr>
+            <p:cNvPr id="10" name="矩形 9"/>
+            <p:cNvSpPr/>
+            <p:nvPr/>
+          </p:nvSpPr>
+          <p:spPr>
+            <a:xfrm>
+              <a:off x="3299287" y="1927274"/>
+              <a:ext cx="253218" cy="253218"/>
+            </a:xfrm>
+            <a:prstGeom prst="rect">
+              <a:avLst/>
+            </a:prstGeom>
+            <a:solidFill>
+              <a:schemeClr val="accent5">
+                <a:lumMod val="75000"/>
+              </a:schemeClr>
+            </a:solidFill>
+            <a:ln w="25400">
+              <a:solidFill>
+                <a:schemeClr val="tx1"/>
+              </a:solidFill>
+            </a:ln>
+          </p:spPr>
+          <p:style>
+            <a:lnRef idx="2">
+              <a:schemeClr val="accent1">
+                <a:shade val="50000"/>
+              </a:schemeClr>
+            </a:lnRef>
+            <a:fillRef idx="1">
+              <a:schemeClr val="accent1"/>
+            </a:fillRef>
+            <a:effectRef idx="0">
+              <a:schemeClr val="accent1"/>
+            </a:effectRef>
+            <a:fontRef idx="minor">
+              <a:schemeClr val="lt1"/>
+            </a:fontRef>
+          </p:style>
+          <p:txBody>
+            <a:bodyPr rtlCol="0" anchor="ctr"/>
+            <a:lstStyle/>
+            <a:p>
+              <a:pPr algn="ctr"/>
+              <a:endParaRPr lang="zh-TW" altLang="en-US"/>
+            </a:p>
+          </p:txBody>
+        </p:sp>
+      </p:grpSp>
+      <p:grpSp>
+        <p:nvGrpSpPr>
+          <p:cNvPr id="9" name="群組 23"/>
+          <p:cNvGrpSpPr/>
+          <p:nvPr/>
+        </p:nvGrpSpPr>
+        <p:grpSpPr>
+          <a:xfrm>
+            <a:off x="6248631" y="686448"/>
+            <a:ext cx="3902893" cy="2686137"/>
+            <a:chOff x="1133341" y="1210613"/>
+            <a:chExt cx="3902893" cy="2686137"/>
+          </a:xfrm>
+        </p:grpSpPr>
+        <p:sp>
+          <p:nvSpPr>
+            <p:cNvPr id="11" name="矩形 3"/>
+            <p:cNvSpPr/>
+            <p:nvPr/>
+          </p:nvSpPr>
+          <p:spPr>
+            <a:xfrm>
+              <a:off x="1133341" y="1210613"/>
+              <a:ext cx="3902893" cy="2686137"/>
+            </a:xfrm>
+            <a:prstGeom prst="rect">
+              <a:avLst/>
+            </a:prstGeom>
+            <a:solidFill>
+              <a:schemeClr val="bg1">
+                <a:lumMod val="65000"/>
+              </a:schemeClr>
+            </a:solidFill>
+            <a:ln>
+              <a:solidFill>
+                <a:schemeClr val="tx1"/>
+              </a:solidFill>
+            </a:ln>
+          </p:spPr>
+          <p:style>
+            <a:lnRef idx="2">
+              <a:schemeClr val="accent1">
+                <a:shade val="50000"/>
+              </a:schemeClr>
+            </a:lnRef>
+            <a:fillRef idx="1">
+              <a:schemeClr val="accent1"/>
+            </a:fillRef>
+            <a:effectRef idx="0">
+              <a:schemeClr val="accent1"/>
+            </a:effectRef>
+            <a:fontRef idx="minor">
+              <a:schemeClr val="lt1"/>
+            </a:fontRef>
+          </p:style>
+          <p:txBody>
+            <a:bodyPr rtlCol="0" anchor="ctr"/>
+            <a:lstStyle/>
+            <a:p>
+              <a:pPr algn="ctr"/>
+              <a:endParaRPr lang="zh-TW" altLang="en-US"/>
+            </a:p>
+          </p:txBody>
+        </p:sp>
+        <p:sp>
+          <p:nvSpPr>
+            <p:cNvPr id="12" name="矩形 5"/>
+            <p:cNvSpPr/>
+            <p:nvPr/>
+          </p:nvSpPr>
+          <p:spPr>
+            <a:xfrm>
+              <a:off x="2831569" y="1842868"/>
+              <a:ext cx="253218" cy="253218"/>
+            </a:xfrm>
+            <a:prstGeom prst="rect">
+              <a:avLst/>
+            </a:prstGeom>
+            <a:solidFill>
+              <a:srgbClr val="FF0000"/>
+            </a:solidFill>
+            <a:ln w="25400">
+              <a:solidFill>
+                <a:schemeClr val="tx1"/>
+              </a:solidFill>
+            </a:ln>
+          </p:spPr>
+          <p:style>
+            <a:lnRef idx="2">
+              <a:schemeClr val="accent1">
+                <a:shade val="50000"/>
+              </a:schemeClr>
+            </a:lnRef>
+            <a:fillRef idx="1">
+              <a:schemeClr val="accent1"/>
+            </a:fillRef>
+            <a:effectRef idx="0">
+              <a:schemeClr val="accent1"/>
+            </a:effectRef>
+            <a:fontRef idx="minor">
+              <a:schemeClr val="lt1"/>
+            </a:fontRef>
+          </p:style>
+          <p:txBody>
+            <a:bodyPr rtlCol="0" anchor="ctr"/>
+            <a:lstStyle/>
+            <a:p>
+              <a:pPr algn="ctr"/>
+              <a:endParaRPr lang="zh-TW" altLang="en-US"/>
+            </a:p>
+          </p:txBody>
+        </p:sp>
+        <p:sp>
+          <p:nvSpPr>
+            <p:cNvPr id="13" name="矩形 6"/>
+            <p:cNvSpPr/>
+            <p:nvPr/>
+          </p:nvSpPr>
+          <p:spPr>
+            <a:xfrm>
+              <a:off x="2820817" y="3097238"/>
+              <a:ext cx="253218" cy="253218"/>
             </a:xfrm>
             <a:prstGeom prst="rect">
               <a:avLst/>
             </a:prstGeom>
             <a:noFill/>
+            <a:ln w="25400">
+              <a:solidFill>
+                <a:schemeClr val="tx1"/>
+              </a:solidFill>
+            </a:ln>
           </p:spPr>
+          <p:style>
+            <a:lnRef idx="2">
+              <a:schemeClr val="accent1">
+                <a:shade val="50000"/>
+              </a:schemeClr>
+            </a:lnRef>
+            <a:fillRef idx="1">
+              <a:schemeClr val="accent1"/>
+            </a:fillRef>
+            <a:effectRef idx="0">
+              <a:schemeClr val="accent1"/>
+            </a:effectRef>
+            <a:fontRef idx="minor">
+              <a:schemeClr val="lt1"/>
+            </a:fontRef>
+          </p:style>
           <p:txBody>
-            <a:bodyPr wrap="none" rtlCol="0">
-              <a:spAutoFit/>
-            </a:bodyPr>
+            <a:bodyPr rtlCol="0" anchor="ctr"/>
             <a:lstStyle/>
             <a:p>
               <a:pPr algn="ctr"/>
-              <a:r>
-                <a:rPr lang="en-US" altLang="zh-TW" dirty="0" smtClean="0"/>
-                <a:t>dissimilar</a:t>
-              </a:r>
-              <a:endParaRPr lang="zh-TW" altLang="en-US" dirty="0"/>
+              <a:endParaRPr lang="zh-TW" altLang="en-US"/>
             </a:p>
           </p:txBody>
         </p:sp>
         <p:sp>
           <p:nvSpPr>
-            <p:cNvPr id="58" name="文字方塊 57"/>
-            <p:cNvSpPr txBox="1"/>
+            <p:cNvPr id="14" name="矩形 7"/>
+            <p:cNvSpPr/>
             <p:nvPr/>
           </p:nvSpPr>
           <p:spPr>
             <a:xfrm>
-              <a:off x="4866762" y="3202231"/>
-              <a:ext cx="808235" cy="369332"/>
+              <a:off x="2272707" y="2242485"/>
+              <a:ext cx="253218" cy="253218"/>
             </a:xfrm>
             <a:prstGeom prst="rect">
               <a:avLst/>
             </a:prstGeom>
             <a:noFill/>
+            <a:ln w="25400">
+              <a:solidFill>
+                <a:schemeClr val="tx1"/>
+              </a:solidFill>
+            </a:ln>
           </p:spPr>
+          <p:style>
+            <a:lnRef idx="2">
+              <a:schemeClr val="accent1">
+                <a:shade val="50000"/>
+              </a:schemeClr>
+            </a:lnRef>
+            <a:fillRef idx="1">
+              <a:schemeClr val="accent1"/>
+            </a:fillRef>
+            <a:effectRef idx="0">
+              <a:schemeClr val="accent1"/>
+            </a:effectRef>
+            <a:fontRef idx="minor">
+              <a:schemeClr val="lt1"/>
+            </a:fontRef>
+          </p:style>
           <p:txBody>
-            <a:bodyPr wrap="none" rtlCol="0">
-              <a:spAutoFit/>
-            </a:bodyPr>
+            <a:bodyPr rtlCol="0" anchor="ctr"/>
             <a:lstStyle/>
             <a:p>
               <a:pPr algn="ctr"/>
-              <a:r>
-                <a:rPr lang="en-US" altLang="zh-TW" dirty="0" smtClean="0"/>
-                <a:t>similar</a:t>
-              </a:r>
-              <a:endParaRPr lang="zh-TW" altLang="en-US" dirty="0"/>
+              <a:endParaRPr lang="zh-TW" altLang="en-US"/>
+            </a:p>
+          </p:txBody>
+        </p:sp>
+        <p:sp>
+          <p:nvSpPr>
+            <p:cNvPr id="15" name="矩形 9"/>
+            <p:cNvSpPr/>
+            <p:nvPr/>
+          </p:nvSpPr>
+          <p:spPr>
+            <a:xfrm>
+              <a:off x="3299287" y="1927274"/>
+              <a:ext cx="253218" cy="253218"/>
+            </a:xfrm>
+            <a:prstGeom prst="rect">
+              <a:avLst/>
+            </a:prstGeom>
+            <a:noFill/>
+            <a:ln w="25400">
+              <a:solidFill>
+                <a:schemeClr val="tx1"/>
+              </a:solidFill>
+            </a:ln>
+          </p:spPr>
+          <p:style>
+            <a:lnRef idx="2">
+              <a:schemeClr val="accent1">
+                <a:shade val="50000"/>
+              </a:schemeClr>
+            </a:lnRef>
+            <a:fillRef idx="1">
+              <a:schemeClr val="accent1"/>
+            </a:fillRef>
+            <a:effectRef idx="0">
+              <a:schemeClr val="accent1"/>
+            </a:effectRef>
+            <a:fontRef idx="minor">
+              <a:schemeClr val="lt1"/>
+            </a:fontRef>
+          </p:style>
+          <p:txBody>
+            <a:bodyPr rtlCol="0" anchor="ctr"/>
+            <a:lstStyle/>
+            <a:p>
+              <a:pPr algn="ctr"/>
+              <a:endParaRPr lang="zh-TW" altLang="en-US"/>
             </a:p>
           </p:txBody>
         </p:sp>
       </p:grpSp>
+      <p:cxnSp>
+        <p:nvCxnSpPr>
+          <p:cNvPr id="16" name="Straight Arrow Connector 15"/>
+          <p:cNvCxnSpPr/>
+          <p:nvPr/>
+        </p:nvCxnSpPr>
+        <p:spPr>
+          <a:xfrm flipV="1">
+            <a:off x="5313012" y="1971538"/>
+            <a:ext cx="653839" cy="842758"/>
+          </a:xfrm>
+          <a:prstGeom prst="straightConnector1">
+            <a:avLst/>
+          </a:prstGeom>
+          <a:ln>
+            <a:tailEnd type="triangle"/>
+          </a:ln>
+        </p:spPr>
+        <p:style>
+          <a:lnRef idx="3">
+            <a:schemeClr val="dk1"/>
+          </a:lnRef>
+          <a:fillRef idx="0">
+            <a:schemeClr val="dk1"/>
+          </a:fillRef>
+          <a:effectRef idx="2">
+            <a:schemeClr val="dk1"/>
+          </a:effectRef>
+          <a:fontRef idx="minor">
+            <a:schemeClr val="tx1"/>
+          </a:fontRef>
+        </p:style>
+      </p:cxnSp>
+      <p:grpSp>
+        <p:nvGrpSpPr>
+          <p:cNvPr id="18" name="群組 23"/>
+          <p:cNvGrpSpPr/>
+          <p:nvPr/>
+        </p:nvGrpSpPr>
+        <p:grpSpPr>
+          <a:xfrm>
+            <a:off x="6248630" y="3651790"/>
+            <a:ext cx="3902893" cy="2686137"/>
+            <a:chOff x="1133341" y="1210613"/>
+            <a:chExt cx="3902893" cy="2686137"/>
+          </a:xfrm>
+        </p:grpSpPr>
+        <p:sp>
+          <p:nvSpPr>
+            <p:cNvPr id="19" name="矩形 3"/>
+            <p:cNvSpPr/>
+            <p:nvPr/>
+          </p:nvSpPr>
+          <p:spPr>
+            <a:xfrm>
+              <a:off x="1133341" y="1210613"/>
+              <a:ext cx="3902893" cy="2686137"/>
+            </a:xfrm>
+            <a:prstGeom prst="rect">
+              <a:avLst/>
+            </a:prstGeom>
+            <a:solidFill>
+              <a:schemeClr val="bg1">
+                <a:lumMod val="65000"/>
+              </a:schemeClr>
+            </a:solidFill>
+            <a:ln>
+              <a:solidFill>
+                <a:schemeClr val="tx1"/>
+              </a:solidFill>
+            </a:ln>
+          </p:spPr>
+          <p:style>
+            <a:lnRef idx="2">
+              <a:schemeClr val="accent1">
+                <a:shade val="50000"/>
+              </a:schemeClr>
+            </a:lnRef>
+            <a:fillRef idx="1">
+              <a:schemeClr val="accent1"/>
+            </a:fillRef>
+            <a:effectRef idx="0">
+              <a:schemeClr val="accent1"/>
+            </a:effectRef>
+            <a:fontRef idx="minor">
+              <a:schemeClr val="lt1"/>
+            </a:fontRef>
+          </p:style>
+          <p:txBody>
+            <a:bodyPr rtlCol="0" anchor="ctr"/>
+            <a:lstStyle/>
+            <a:p>
+              <a:pPr algn="ctr"/>
+              <a:endParaRPr lang="zh-TW" altLang="en-US"/>
+            </a:p>
+          </p:txBody>
+        </p:sp>
+        <p:sp>
+          <p:nvSpPr>
+            <p:cNvPr id="20" name="矩形 5"/>
+            <p:cNvSpPr/>
+            <p:nvPr/>
+          </p:nvSpPr>
+          <p:spPr>
+            <a:xfrm>
+              <a:off x="2831569" y="1842868"/>
+              <a:ext cx="253218" cy="253218"/>
+            </a:xfrm>
+            <a:prstGeom prst="rect">
+              <a:avLst/>
+            </a:prstGeom>
+            <a:solidFill>
+              <a:srgbClr val="00B050"/>
+            </a:solidFill>
+            <a:ln w="25400">
+              <a:solidFill>
+                <a:schemeClr val="tx1"/>
+              </a:solidFill>
+            </a:ln>
+          </p:spPr>
+          <p:style>
+            <a:lnRef idx="2">
+              <a:schemeClr val="accent1">
+                <a:shade val="50000"/>
+              </a:schemeClr>
+            </a:lnRef>
+            <a:fillRef idx="1">
+              <a:schemeClr val="accent1"/>
+            </a:fillRef>
+            <a:effectRef idx="0">
+              <a:schemeClr val="accent1"/>
+            </a:effectRef>
+            <a:fontRef idx="minor">
+              <a:schemeClr val="lt1"/>
+            </a:fontRef>
+          </p:style>
+          <p:txBody>
+            <a:bodyPr rtlCol="0" anchor="ctr"/>
+            <a:lstStyle/>
+            <a:p>
+              <a:pPr algn="ctr"/>
+              <a:endParaRPr lang="zh-TW" altLang="en-US"/>
+            </a:p>
+          </p:txBody>
+        </p:sp>
+        <p:sp>
+          <p:nvSpPr>
+            <p:cNvPr id="21" name="矩形 6"/>
+            <p:cNvSpPr/>
+            <p:nvPr/>
+          </p:nvSpPr>
+          <p:spPr>
+            <a:xfrm>
+              <a:off x="2820817" y="3097238"/>
+              <a:ext cx="253218" cy="253218"/>
+            </a:xfrm>
+            <a:prstGeom prst="rect">
+              <a:avLst/>
+            </a:prstGeom>
+            <a:noFill/>
+            <a:ln w="25400">
+              <a:solidFill>
+                <a:schemeClr val="tx1"/>
+              </a:solidFill>
+            </a:ln>
+          </p:spPr>
+          <p:style>
+            <a:lnRef idx="2">
+              <a:schemeClr val="accent1">
+                <a:shade val="50000"/>
+              </a:schemeClr>
+            </a:lnRef>
+            <a:fillRef idx="1">
+              <a:schemeClr val="accent1"/>
+            </a:fillRef>
+            <a:effectRef idx="0">
+              <a:schemeClr val="accent1"/>
+            </a:effectRef>
+            <a:fontRef idx="minor">
+              <a:schemeClr val="lt1"/>
+            </a:fontRef>
+          </p:style>
+          <p:txBody>
+            <a:bodyPr rtlCol="0" anchor="ctr"/>
+            <a:lstStyle/>
+            <a:p>
+              <a:pPr algn="ctr"/>
+              <a:endParaRPr lang="zh-TW" altLang="en-US"/>
+            </a:p>
+          </p:txBody>
+        </p:sp>
+        <p:sp>
+          <p:nvSpPr>
+            <p:cNvPr id="22" name="矩形 7"/>
+            <p:cNvSpPr/>
+            <p:nvPr/>
+          </p:nvSpPr>
+          <p:spPr>
+            <a:xfrm>
+              <a:off x="2272707" y="2242485"/>
+              <a:ext cx="253218" cy="253218"/>
+            </a:xfrm>
+            <a:prstGeom prst="rect">
+              <a:avLst/>
+            </a:prstGeom>
+            <a:noFill/>
+            <a:ln w="25400">
+              <a:solidFill>
+                <a:schemeClr val="tx1"/>
+              </a:solidFill>
+            </a:ln>
+          </p:spPr>
+          <p:style>
+            <a:lnRef idx="2">
+              <a:schemeClr val="accent1">
+                <a:shade val="50000"/>
+              </a:schemeClr>
+            </a:lnRef>
+            <a:fillRef idx="1">
+              <a:schemeClr val="accent1"/>
+            </a:fillRef>
+            <a:effectRef idx="0">
+              <a:schemeClr val="accent1"/>
+            </a:effectRef>
+            <a:fontRef idx="minor">
+              <a:schemeClr val="lt1"/>
+            </a:fontRef>
+          </p:style>
+          <p:txBody>
+            <a:bodyPr rtlCol="0" anchor="ctr"/>
+            <a:lstStyle/>
+            <a:p>
+              <a:pPr algn="ctr"/>
+              <a:endParaRPr lang="zh-TW" altLang="en-US"/>
+            </a:p>
+          </p:txBody>
+        </p:sp>
+        <p:sp>
+          <p:nvSpPr>
+            <p:cNvPr id="23" name="矩形 9"/>
+            <p:cNvSpPr/>
+            <p:nvPr/>
+          </p:nvSpPr>
+          <p:spPr>
+            <a:xfrm>
+              <a:off x="3299287" y="1927274"/>
+              <a:ext cx="253218" cy="253218"/>
+            </a:xfrm>
+            <a:prstGeom prst="rect">
+              <a:avLst/>
+            </a:prstGeom>
+            <a:noFill/>
+            <a:ln w="25400">
+              <a:solidFill>
+                <a:schemeClr val="tx1"/>
+              </a:solidFill>
+            </a:ln>
+          </p:spPr>
+          <p:style>
+            <a:lnRef idx="2">
+              <a:schemeClr val="accent1">
+                <a:shade val="50000"/>
+              </a:schemeClr>
+            </a:lnRef>
+            <a:fillRef idx="1">
+              <a:schemeClr val="accent1"/>
+            </a:fillRef>
+            <a:effectRef idx="0">
+              <a:schemeClr val="accent1"/>
+            </a:effectRef>
+            <a:fontRef idx="minor">
+              <a:schemeClr val="lt1"/>
+            </a:fontRef>
+          </p:style>
+          <p:txBody>
+            <a:bodyPr rtlCol="0" anchor="ctr"/>
+            <a:lstStyle/>
+            <a:p>
+              <a:pPr algn="ctr"/>
+              <a:endParaRPr lang="zh-TW" altLang="en-US"/>
+            </a:p>
+          </p:txBody>
+        </p:sp>
+      </p:grpSp>
+      <p:cxnSp>
+        <p:nvCxnSpPr>
+          <p:cNvPr id="25" name="Straight Arrow Connector 24"/>
+          <p:cNvCxnSpPr/>
+          <p:nvPr/>
+        </p:nvCxnSpPr>
+        <p:spPr>
+          <a:xfrm>
+            <a:off x="5313012" y="4195275"/>
+            <a:ext cx="653839" cy="799583"/>
+          </a:xfrm>
+          <a:prstGeom prst="straightConnector1">
+            <a:avLst/>
+          </a:prstGeom>
+          <a:ln>
+            <a:tailEnd type="triangle"/>
+          </a:ln>
+        </p:spPr>
+        <p:style>
+          <a:lnRef idx="3">
+            <a:schemeClr val="dk1"/>
+          </a:lnRef>
+          <a:fillRef idx="0">
+            <a:schemeClr val="dk1"/>
+          </a:fillRef>
+          <a:effectRef idx="2">
+            <a:schemeClr val="dk1"/>
+          </a:effectRef>
+          <a:fontRef idx="minor">
+            <a:schemeClr val="tx1"/>
+          </a:fontRef>
+        </p:style>
+      </p:cxnSp>
+      <p:sp>
+        <p:nvSpPr>
+          <p:cNvPr id="30" name="TextBox 29"/>
+          <p:cNvSpPr txBox="1"/>
+          <p:nvPr/>
+        </p:nvSpPr>
+        <p:spPr>
+          <a:xfrm>
+            <a:off x="10306266" y="1774556"/>
+            <a:ext cx="1104533" cy="646331"/>
+          </a:xfrm>
+          <a:prstGeom prst="rect">
+            <a:avLst/>
+          </a:prstGeom>
+          <a:noFill/>
+        </p:spPr>
+        <p:txBody>
+          <a:bodyPr wrap="none" rtlCol="0">
+            <a:spAutoFit/>
+          </a:bodyPr>
+          <a:lstStyle/>
+          <a:p>
+            <a:pPr algn="ctr"/>
+            <a:r>
+              <a:rPr lang="en-US" dirty="0" smtClean="0"/>
+              <a:t>“same”</a:t>
+            </a:r>
+            <a:br>
+              <a:rPr lang="en-US" dirty="0" smtClean="0"/>
+            </a:br>
+            <a:r>
+              <a:rPr lang="en-US" dirty="0" smtClean="0"/>
+              <a:t>left arrow</a:t>
+            </a:r>
+            <a:endParaRPr lang="de-CH" dirty="0"/>
+          </a:p>
+        </p:txBody>
+      </p:sp>
+      <p:sp>
+        <p:nvSpPr>
+          <p:cNvPr id="31" name="TextBox 30"/>
+          <p:cNvSpPr txBox="1"/>
+          <p:nvPr/>
+        </p:nvSpPr>
+        <p:spPr>
+          <a:xfrm>
+            <a:off x="10290875" y="5067946"/>
+            <a:ext cx="1274388" cy="646331"/>
+          </a:xfrm>
+          <a:prstGeom prst="rect">
+            <a:avLst/>
+          </a:prstGeom>
+          <a:noFill/>
+        </p:spPr>
+        <p:txBody>
+          <a:bodyPr wrap="none" rtlCol="0">
+            <a:spAutoFit/>
+          </a:bodyPr>
+          <a:lstStyle/>
+          <a:p>
+            <a:pPr algn="ctr"/>
+            <a:r>
+              <a:rPr lang="en-US" dirty="0" smtClean="0"/>
+              <a:t>“change”</a:t>
+            </a:r>
+          </a:p>
+          <a:p>
+            <a:pPr algn="ctr"/>
+            <a:r>
+              <a:rPr lang="en-US" dirty="0" smtClean="0"/>
+              <a:t>right arrow</a:t>
+            </a:r>
+            <a:endParaRPr lang="de-CH" dirty="0"/>
+          </a:p>
+        </p:txBody>
+      </p:sp>
+      <p:cxnSp>
+        <p:nvCxnSpPr>
+          <p:cNvPr id="35" name="Straight Arrow Connector 34"/>
+          <p:cNvCxnSpPr/>
+          <p:nvPr/>
+        </p:nvCxnSpPr>
+        <p:spPr>
+          <a:xfrm flipH="1">
+            <a:off x="10724828" y="2573073"/>
+            <a:ext cx="325464" cy="0"/>
+          </a:xfrm>
+          <a:prstGeom prst="straightConnector1">
+            <a:avLst/>
+          </a:prstGeom>
+          <a:ln>
+            <a:tailEnd type="triangle"/>
+          </a:ln>
+        </p:spPr>
+        <p:style>
+          <a:lnRef idx="3">
+            <a:schemeClr val="dk1"/>
+          </a:lnRef>
+          <a:fillRef idx="0">
+            <a:schemeClr val="dk1"/>
+          </a:fillRef>
+          <a:effectRef idx="2">
+            <a:schemeClr val="dk1"/>
+          </a:effectRef>
+          <a:fontRef idx="minor">
+            <a:schemeClr val="tx1"/>
+          </a:fontRef>
+        </p:style>
+      </p:cxnSp>
+      <p:cxnSp>
+        <p:nvCxnSpPr>
+          <p:cNvPr id="36" name="Straight Arrow Connector 35"/>
+          <p:cNvCxnSpPr/>
+          <p:nvPr/>
+        </p:nvCxnSpPr>
+        <p:spPr>
+          <a:xfrm>
+            <a:off x="10724828" y="5881607"/>
+            <a:ext cx="325464" cy="0"/>
+          </a:xfrm>
+          <a:prstGeom prst="straightConnector1">
+            <a:avLst/>
+          </a:prstGeom>
+          <a:ln>
+            <a:tailEnd type="triangle"/>
+          </a:ln>
+        </p:spPr>
+        <p:style>
+          <a:lnRef idx="3">
+            <a:schemeClr val="dk1"/>
+          </a:lnRef>
+          <a:fillRef idx="0">
+            <a:schemeClr val="dk1"/>
+          </a:fillRef>
+          <a:effectRef idx="2">
+            <a:schemeClr val="dk1"/>
+          </a:effectRef>
+          <a:fontRef idx="minor">
+            <a:schemeClr val="tx1"/>
+          </a:fontRef>
+        </p:style>
+      </p:cxnSp>
     </p:spTree>
     <p:extLst>
       <p:ext uri="{BB962C8B-B14F-4D97-AF65-F5344CB8AC3E}">
-        <p14:creationId xmlns:p14="http://schemas.microsoft.com/office/powerpoint/2010/main" val="3557398673"/>
+        <p14:creationId xmlns:p14="http://schemas.microsoft.com/office/powerpoint/2010/main" val="3033638110"/>
       </p:ext>
     </p:extLst>
   </p:cSld>

</xml_diff>